<commit_message>
Fix local PPT validation loop for strict render and real-output checks
</commit_message>
<xml_diff>
--- a/backend/market-research/test-output.pptx
+++ b/backend/market-research/test-output.pptx
@@ -13381,10 +13381,10 @@
             <a:tbl>
               <a:tblPr/>
               <a:tblGrid>
-                <a:gridCol w="1646020"/>
-                <a:gridCol w="1038190"/>
-                <a:gridCol w="1038190"/>
-                <a:gridCol w="7786422"/>
+                <a:gridCol w="1096078"/>
+                <a:gridCol w="1096078"/>
+                <a:gridCol w="1096078"/>
+                <a:gridCol w="8220587"/>
               </a:tblGrid>
               <a:tr h="1187851">
                 <a:tc>
@@ -13851,7 +13851,7 @@
                           <a:ea typeface="Segoe UI" pitchFamily="34" charset="-122"/>
                           <a:cs typeface="Segoe UI" pitchFamily="34" charset="-120"/>
                         </a:rPr>
-                        <a:t>Leading HVAC and energy management provider with THB 12.5B revenue in Thailand. Controls 28% of commercial HVAC market through integrated building management solutions targeting Japanese auto and electronics...</a:t>
+                        <a:t>Leading HVAC and energy management provider with THB 12.5B revenue in Thailand. Controls 28% of commercial HVAC market through integrated building management solutions targeting Japanese auto and electronics manufacturers. Annual growth of 8% driven by factory modernization projects across Eastern Seaboard industrial estates. Market presence: Since 1990, 3 facilities. Entered market: 1990.</a:t>
                       </a:r>
                       <a:endParaRPr lang="en-US" sz="1400" dirty="0">
                         <a:latin typeface="Segoe UI" charset="0"/>
@@ -14103,7 +14103,7 @@
                           <a:ea typeface="Segoe UI" pitchFamily="34" charset="-122"/>
                           <a:cs typeface="Segoe UI" pitchFamily="34" charset="-120"/>
                         </a:rPr>
-                        <a:t>Grid modernization and industrial energy management specialist with THB 4.2B Thai revenue. Focuses on power quality and distribution solutions for heavy industry. Revenue grew 15% in 2023 driven by EV manufacturing...</a:t>
+                        <a:t>Grid modernization and industrial energy management specialist with THB 4.2B Thai revenue. Focuses on power quality and distribution solutions for heavy industry. Revenue grew 15% in 2023 driven by EV manufacturing plant energy systems for Toyota and Honda Thailand operations. Market presence: Since 2001, 2 offices. Entered market: 2001.</a:t>
                       </a:r>
                       <a:endParaRPr lang="en-US" sz="1400" dirty="0">
                         <a:latin typeface="Segoe UI" charset="0"/>
@@ -14355,7 +14355,7 @@
                           <a:ea typeface="Segoe UI" pitchFamily="34" charset="-122"/>
                           <a:cs typeface="Segoe UI" pitchFamily="34" charset="-120"/>
                         </a:rPr>
-                        <a:t>Diversified energy solutions including solar PV, battery storage, and building management systems with THB 3.8B revenue. Serves both commercial buildings and industrial facilities with integrated IoT-based energy...</a:t>
+                        <a:t>Diversified energy solutions including solar PV, battery storage, and building management systems with THB 3.8B revenue. Serves both commercial buildings and industrial facilities with integrated IoT-based energy monitoring platforms generating recurring service revenue of THB 450M annually. Market presence: Since 1988, regional hub. Entered market: 1988.</a:t>
                       </a:r>
                       <a:endParaRPr lang="en-US" sz="1400" dirty="0">
                         <a:latin typeface="Segoe UI" charset="0"/>
@@ -14717,10 +14717,10 @@
             <a:tbl>
               <a:tblPr/>
               <a:tblGrid>
-                <a:gridCol w="1556368"/>
-                <a:gridCol w="1325795"/>
-                <a:gridCol w="1014901"/>
-                <a:gridCol w="7611757"/>
+                <a:gridCol w="1096078"/>
+                <a:gridCol w="1096078"/>
+                <a:gridCol w="1096078"/>
+                <a:gridCol w="8220587"/>
               </a:tblGrid>
               <a:tr h="1187851">
                 <a:tc>
@@ -15195,7 +15195,7 @@
                           <a:ea typeface="Segoe UI" pitchFamily="34" charset="-122"/>
                           <a:cs typeface="Segoe UI" pitchFamily="34" charset="-120"/>
                         </a:rPr>
-                        <a:t>Largest Thai ESCO by project count with 300+ completed energy savings contracts across government and industrial segments. Revenue grew 22% YoY driven by mandatory government building retrofits. Strong relationships...</a:t>
+                        <a:t>Largest Thai ESCO by project count with 300+ completed energy savings contracts across government and industrial segments. Revenue grew 22% YoY driven by mandatory government building retrofits. Strong relationships with DEDE and provincial energy offices provide pipeline visibility. Revenue: THB 8.2B. Market share: 15%. Company type: Listed energy company.</a:t>
                       </a:r>
                       <a:endParaRPr lang="en-US" sz="1400" dirty="0">
                         <a:latin typeface="Segoe UI" charset="0"/>
@@ -15455,7 +15455,7 @@
                           <a:ea typeface="Segoe UI" pitchFamily="34" charset="-122"/>
                           <a:cs typeface="Segoe UI" pitchFamily="34" charset="-120"/>
                         </a:rPr>
-                        <a:t>Diversified clean energy group expanding into ESCO services from renewable generation base. THB 15.1B total revenue with ESCO segment growing 35% to reach THB 1.2B in 2023. Leverages existing solar and wind farm...</a:t>
+                        <a:t>Diversified clean energy group expanding into ESCO services from renewable generation base. THB 15.1B total revenue with ESCO segment growing 35% to reach THB 1.2B in 2023. Leverages existing solar and wind farm relationships to cross-sell efficiency services to industrial clients. Market share: 8%. Company type: Listed renewable energy.</a:t>
                       </a:r>
                       <a:endParaRPr lang="en-US" sz="1400" dirty="0">
                         <a:latin typeface="Segoe UI" charset="0"/>
@@ -15715,7 +15715,7 @@
                           <a:ea typeface="Segoe UI" pitchFamily="34" charset="-122"/>
                           <a:cs typeface="Segoe UI" pitchFamily="34" charset="-120"/>
                         </a:rPr>
-                        <a:t>Engineering-led ESCO with deep technical capabilities in electrical systems and renewable integration. THB 6.8B revenue with 10% market share in industrial segment. Strong execution track record with 95% project...</a:t>
+                        <a:t>Engineering-led ESCO with deep technical capabilities in electrical systems and renewable integration. THB 6.8B revenue with 10% market share in industrial segment. Strong execution track record with 95% project completion rate and 12% average energy savings delivery against guaranteed targets. Company type: Engineering contractor. Company type: Engineering contractor.</a:t>
                       </a:r>
                       <a:endParaRPr lang="en-US" sz="1400" dirty="0">
                         <a:latin typeface="Segoe UI" charset="0"/>
@@ -16120,10 +16120,10 @@
             <a:tbl>
               <a:tblPr/>
               <a:tblGrid>
-                <a:gridCol w="1398696"/>
-                <a:gridCol w="994401"/>
-                <a:gridCol w="1657713"/>
-                <a:gridCol w="7458011"/>
+                <a:gridCol w="1078666"/>
+                <a:gridCol w="1076675"/>
+                <a:gridCol w="1278419"/>
+                <a:gridCol w="8075061"/>
               </a:tblGrid>
               <a:tr h="1187851">
                 <a:tc>
@@ -16598,7 +16598,7 @@
                           <a:ea typeface="Segoe UI" pitchFamily="34" charset="-122"/>
                           <a:cs typeface="Segoe UI" pitchFamily="34" charset="-120"/>
                         </a:rPr>
-                        <a:t>Entered: 1998. Market leader in building management and industrial automation with THB 9.8B Thailand revenue. EcoStruxure platform deployed in 500+ buildings. Recent focus on data center energy optimization as cloud demand surges...</a:t>
+                        <a:t>Market leader in building management and industrial automation with THB 9.8B Thailand revenue. EcoStruxure platform deployed in 500+ buildings. Recent focus on data center energy optimization as cloud demand surges with 45% revenue growth in this segment during 2022-2023. France-based, entered market in 1998. Entry mode: Wholly-owned subsidiary.</a:t>
                       </a:r>
                       <a:endParaRPr lang="en-US" sz="1400" dirty="0">
                         <a:latin typeface="Segoe UI" charset="0"/>
@@ -16858,7 +16858,7 @@
                           <a:ea typeface="Segoe UI" pitchFamily="34" charset="-122"/>
                           <a:cs typeface="Segoe UI" pitchFamily="34" charset="-120"/>
                         </a:rPr>
-                        <a:t>Entered: 2005. Gas turbine services and grid solutions specialist with growing ESCO division. THB 5.5B revenue with 18% growth in digital energy services. MindSphere IoT platform gaining traction in petrochemical sector with 12...</a:t>
+                        <a:t>Gas turbine services and grid solutions specialist with growing ESCO division. THB 5.5B revenue with 18% growth in digital energy services. MindSphere IoT platform gaining traction in petrochemical sector with 12 major deployments at Map Ta Phut industrial estate. Germany-based, entered market in 2005. Entry mode: Joint venture with local partner.</a:t>
                       </a:r>
                       <a:endParaRPr lang="en-US" sz="1400" dirty="0">
                         <a:latin typeface="Segoe UI" charset="0"/>
@@ -17118,7 +17118,7 @@
                           <a:ea typeface="Segoe UI" pitchFamily="34" charset="-122"/>
                           <a:cs typeface="Segoe UI" pitchFamily="34" charset="-120"/>
                         </a:rPr>
-                        <a:t>Entered: 2015. Aggressive expansion in smart building and renewable energy project development. THB 2.1B Thailand revenue growing 28% annually. Leverages Samsung Electronics ecosystem for IoT and building automation integration....</a:t>
+                        <a:t>Aggressive expansion in smart building and renewable energy project development. THB 2.1B Thailand revenue growing 28% annually. Leverages Samsung Electronics ecosystem for IoT and building automation integration. Won 3 major government smart city contracts in 2023 totaling THB 850M. South Korea-based, entered market in 2015. Entry mode: Branch office.</a:t>
                       </a:r>
                       <a:endParaRPr lang="en-US" sz="1400" dirty="0">
                         <a:latin typeface="Segoe UI" charset="0"/>
@@ -19245,11 +19245,11 @@
             <a:tbl>
               <a:tblPr/>
               <a:tblGrid>
-                <a:gridCol w="777623"/>
-                <a:gridCol w="1710771"/>
-                <a:gridCol w="3110492"/>
-                <a:gridCol w="1244197"/>
-                <a:gridCol w="4665738"/>
+                <a:gridCol w="729099"/>
+                <a:gridCol w="1520217"/>
+                <a:gridCol w="2764031"/>
+                <a:gridCol w="1105613"/>
+                <a:gridCol w="5389861"/>
               </a:tblGrid>
               <a:tr h="457200">
                 <a:tc>
@@ -19856,7 +19856,7 @@
                           <a:ea typeface="Segoe UI" pitchFamily="34" charset="-122"/>
                           <a:cs typeface="Segoe UI" pitchFamily="34" charset="-120"/>
                         </a:rPr>
-                        <a:t>Vertical integration into...</a:t>
+                        <a:t>Vertical integration into ESCO services</a:t>
                       </a:r>
                       <a:endParaRPr lang="en-US" sz="1400" dirty="0">
                         <a:latin typeface="Segoe UI" charset="0"/>
@@ -20183,7 +20183,7 @@
                           <a:ea typeface="Segoe UI" pitchFamily="34" charset="-122"/>
                           <a:cs typeface="Segoe UI" pitchFamily="34" charset="-120"/>
                         </a:rPr>
-                        <a:t>Expand downstream energy...</a:t>
+                        <a:t>Expand downstream energy management</a:t>
                       </a:r>
                       <a:endParaRPr lang="en-US" sz="1400" dirty="0">
                         <a:latin typeface="Segoe UI" charset="0"/>
@@ -20510,7 +20510,7 @@
                           <a:ea typeface="Segoe UI" pitchFamily="34" charset="-122"/>
                           <a:cs typeface="Segoe UI" pitchFamily="34" charset="-120"/>
                         </a:rPr>
-                        <a:t>Grid modernization capabili...</a:t>
+                        <a:t>Grid modernization capabilities</a:t>
                       </a:r>
                       <a:endParaRPr lang="en-US" sz="1400" dirty="0">
                         <a:latin typeface="Segoe UI" charset="0"/>
@@ -20625,10 +20625,10 @@
             <a:tbl>
               <a:tblPr/>
               <a:tblGrid>
-                <a:gridCol w="2245624"/>
-                <a:gridCol w="1216379"/>
-                <a:gridCol w="3274868"/>
-                <a:gridCol w="4771950"/>
+                <a:gridCol w="1694550"/>
+                <a:gridCol w="917881"/>
+                <a:gridCol w="5295470"/>
+                <a:gridCol w="3600920"/>
               </a:tblGrid>
               <a:tr h="307330">
                 <a:tc>
@@ -21041,7 +21041,7 @@
                           <a:ea typeface="Segoe UI" pitchFamily="34" charset="-122"/>
                           <a:cs typeface="Segoe UI" pitchFamily="34" charset="-120"/>
                         </a:rPr>
-                        <a:t>Largest independent ESCO with...</a:t>
+                        <a:t>Largest independent ESCO with government contract portfolio</a:t>
                       </a:r>
                       <a:endParaRPr lang="en-US" sz="1400" dirty="0">
                         <a:latin typeface="Segoe UI" charset="0"/>
@@ -21301,7 +21301,7 @@
                           <a:ea typeface="Segoe UI" pitchFamily="34" charset="-122"/>
                           <a:cs typeface="Segoe UI" pitchFamily="34" charset="-120"/>
                         </a:rPr>
-                        <a:t>Leading commercial building ESCO...</a:t>
+                        <a:t>Leading commercial building ESCO with smart building IP</a:t>
                       </a:r>
                       <a:endParaRPr lang="en-US" sz="1400" dirty="0">
                         <a:latin typeface="Segoe UI" charset="0"/>
@@ -21561,7 +21561,7 @@
                           <a:ea typeface="Segoe UI" pitchFamily="34" charset="-122"/>
                           <a:cs typeface="Segoe UI" pitchFamily="34" charset="-120"/>
                         </a:rPr>
-                        <a:t>Industrial process optimization...</a:t>
+                        <a:t>Industrial process optimization specialist with proprietary monitoring tech</a:t>
                       </a:r>
                       <a:endParaRPr lang="en-US" sz="1400" dirty="0">
                         <a:latin typeface="Segoe UI" charset="0"/>
@@ -23616,12 +23616,12 @@
             <a:tbl>
               <a:tblPr/>
               <a:tblGrid>
-                <a:gridCol w="953182"/>
-                <a:gridCol w="1316299"/>
-                <a:gridCol w="879937"/>
-                <a:gridCol w="879937"/>
-                <a:gridCol w="879937"/>
-                <a:gridCol w="6599529"/>
+                <a:gridCol w="920706"/>
+                <a:gridCol w="920706"/>
+                <a:gridCol w="920706"/>
+                <a:gridCol w="920706"/>
+                <a:gridCol w="920706"/>
+                <a:gridCol w="6905293"/>
               </a:tblGrid>
               <a:tr h="1187851">
                 <a:tc>
@@ -24350,7 +24350,7 @@
                           <a:ea typeface="Segoe UI" pitchFamily="34" charset="-122"/>
                           <a:cs typeface="Segoe UI" pitchFamily="34" charset="-120"/>
                         </a:rPr>
-                        <a:t>Bangchak subsidiary focused on clean energy solutions with 250+ commercial ESCO projects and strong BOI relationships. Listed on SET with THB 9.1B revenue. Culture fit is high due to existing Japanese partnerships....</a:t>
+                        <a:t>Bangchak subsidiary focused on clean energy solutions with 250+ commercial ESCO projects and strong BOI relationships. Listed on SET with THB 9.1B revenue. Culture fit is high due to existing Japanese partnerships. Broad renewables portfolio creates clear synergy with foreign technology partner. Company type: Listed ESCO. Partnership fit: 4/5. Acquisition fit: 3/5. Est. valuation: THB 14-18B (listed).</a:t>
                       </a:r>
                       <a:endParaRPr lang="en-US" sz="1400" dirty="0">
                         <a:latin typeface="Segoe UI" charset="0"/>
@@ -24734,7 +24734,7 @@
                           <a:ea typeface="Segoe UI" pitchFamily="34" charset="-122"/>
                           <a:cs typeface="Segoe UI" pitchFamily="34" charset="-120"/>
                         </a:rPr>
-                        <a:t>Leading industrial estate utilities provider with 95% uptime track record. THB 7.5B revenue with proven delivery in industrial energy management. Technical team of 200+ engineers across 11 industrial estates....</a:t>
+                        <a:t>Leading industrial estate utilities provider with 95% uptime track record. THB 7.5B revenue with proven delivery in industrial energy management. Technical team of 200+ engineers across 11 industrial estates. Corporate structure may complicate JV negotiations but strategic interest in ESCO diversification creates clear acquisition rationale.</a:t>
                       </a:r>
                       <a:endParaRPr lang="en-US" sz="1400" dirty="0">
                         <a:latin typeface="Segoe UI" charset="0"/>
@@ -25118,7 +25118,7 @@
                           <a:ea typeface="Segoe UI" pitchFamily="34" charset="-122"/>
                           <a:cs typeface="Segoe UI" pitchFamily="34" charset="-120"/>
                         </a:rPr>
-                        <a:t>Leading independent carbon management and ESCO firm with 15-year track record and government contract portfolio worth THB 2.0B annually. Founder approaching retirement creates acquisition window. Deep relationships...</a:t>
+                        <a:t>Leading independent carbon management and ESCO firm with 15-year track record and government contract portfolio worth THB 2.0B annually. Founder approaching retirement creates acquisition window. Deep relationships with provincial energy offices. Revenue THB 2.8B with stable 25% margins. Company type: Private ESCO. Partnership fit: 5/5. Acquisition fit: 5/5. Est. valuation: THB 900M-1.4B.</a:t>
                       </a:r>
                       <a:endParaRPr lang="en-US" sz="1400" dirty="0">
                         <a:latin typeface="Segoe UI" charset="0"/>
@@ -26186,49 +26186,7 @@
                           <a:ea typeface="Segoe UI" pitchFamily="34" charset="-122"/>
                           <a:cs typeface="Segoe UI" pitchFamily="34" charset="-120"/>
                         </a:rPr>
-                        <a:t>+ Immediate local market access</a:t>
-                      </a:r>
-                      <a:endParaRPr lang="en-US" sz="1400" dirty="0">
-                        <a:latin typeface="Segoe UI" charset="0"/>
-                        <a:ea typeface="Segoe UI" charset="0"/>
-                        <a:cs typeface="Segoe UI" charset="0"/>
-                      </a:endParaRPr>
-                    </a:p>
-                    <a:p>
-                      <a:pPr indent="0" marL="0">
-                        <a:buNone/>
-                      </a:pPr>
-                      <a:r>
-                        <a:rPr lang="en-US" sz="1400" dirty="0">
-                          <a:solidFill>
-                            <a:srgbClr val="000000"/>
-                          </a:solidFill>
-                          <a:latin typeface="Segoe UI" pitchFamily="34" charset="0"/>
-                          <a:ea typeface="Segoe UI" pitchFamily="34" charset="-122"/>
-                          <a:cs typeface="Segoe UI" pitchFamily="34" charset="-120"/>
-                        </a:rPr>
-                        <a:t>+ Shared regulatory burden</a:t>
-                      </a:r>
-                      <a:endParaRPr lang="en-US" sz="1400" dirty="0">
-                        <a:latin typeface="Segoe UI" charset="0"/>
-                        <a:ea typeface="Segoe UI" charset="0"/>
-                        <a:cs typeface="Segoe UI" charset="0"/>
-                      </a:endParaRPr>
-                    </a:p>
-                    <a:p>
-                      <a:pPr indent="0" marL="0">
-                        <a:buNone/>
-                      </a:pPr>
-                      <a:r>
-                        <a:rPr lang="en-US" sz="1400" dirty="0">
-                          <a:solidFill>
-                            <a:srgbClr val="000000"/>
-                          </a:solidFill>
-                          <a:latin typeface="Segoe UI" pitchFamily="34" charset="0"/>
-                          <a:ea typeface="Segoe UI" pitchFamily="34" charset="-122"/>
-                          <a:cs typeface="Segoe UI" pitchFamily="34" charset="-120"/>
-                        </a:rPr>
-                        <a:t>+ Local talent and relationships</a:t>
+                        <a:t>+ Immediate local market access + Shared regulatory burden + Local talent and relationships</a:t>
                       </a:r>
                       <a:endParaRPr lang="en-US" sz="1400" dirty="0">
                         <a:latin typeface="Segoe UI" charset="0"/>
@@ -26293,49 +26251,7 @@
                           <a:ea typeface="Segoe UI" pitchFamily="34" charset="-122"/>
                           <a:cs typeface="Segoe UI" pitchFamily="34" charset="-120"/>
                         </a:rPr>
-                        <a:t>- Shared decision-making</a:t>
-                      </a:r>
-                      <a:endParaRPr lang="en-US" sz="1400" dirty="0">
-                        <a:latin typeface="Segoe UI" charset="0"/>
-                        <a:ea typeface="Segoe UI" charset="0"/>
-                        <a:cs typeface="Segoe UI" charset="0"/>
-                      </a:endParaRPr>
-                    </a:p>
-                    <a:p>
-                      <a:pPr indent="0" marL="0">
-                        <a:buNone/>
-                      </a:pPr>
-                      <a:r>
-                        <a:rPr lang="en-US" sz="1400" dirty="0">
-                          <a:solidFill>
-                            <a:srgbClr val="000000"/>
-                          </a:solidFill>
-                          <a:latin typeface="Segoe UI" pitchFamily="34" charset="0"/>
-                          <a:ea typeface="Segoe UI" pitchFamily="34" charset="-122"/>
-                          <a:cs typeface="Segoe UI" pitchFamily="34" charset="-120"/>
-                        </a:rPr>
-                        <a:t>- Potential culture clashes</a:t>
-                      </a:r>
-                      <a:endParaRPr lang="en-US" sz="1400" dirty="0">
-                        <a:latin typeface="Segoe UI" charset="0"/>
-                        <a:ea typeface="Segoe UI" charset="0"/>
-                        <a:cs typeface="Segoe UI" charset="0"/>
-                      </a:endParaRPr>
-                    </a:p>
-                    <a:p>
-                      <a:pPr indent="0" marL="0">
-                        <a:buNone/>
-                      </a:pPr>
-                      <a:r>
-                        <a:rPr lang="en-US" sz="1400" dirty="0">
-                          <a:solidFill>
-                            <a:srgbClr val="000000"/>
-                          </a:solidFill>
-                          <a:latin typeface="Segoe UI" pitchFamily="34" charset="0"/>
-                          <a:ea typeface="Segoe UI" pitchFamily="34" charset="-122"/>
-                          <a:cs typeface="Segoe UI" pitchFamily="34" charset="-120"/>
-                        </a:rPr>
-                        <a:t>- Complex exit mechanisms</a:t>
+                        <a:t>- Shared decision-making - Potential culture clashes - Complex exit mechanisms</a:t>
                       </a:r>
                       <a:endParaRPr lang="en-US" sz="1400" dirty="0">
                         <a:latin typeface="Segoe UI" charset="0"/>
@@ -26727,49 +26643,7 @@
                           <a:ea typeface="Segoe UI" pitchFamily="34" charset="-122"/>
                           <a:cs typeface="Segoe UI" pitchFamily="34" charset="-120"/>
                         </a:rPr>
-                        <a:t>+ Full control of operations</a:t>
-                      </a:r>
-                      <a:endParaRPr lang="en-US" sz="1400" dirty="0">
-                        <a:latin typeface="Segoe UI" charset="0"/>
-                        <a:ea typeface="Segoe UI" charset="0"/>
-                        <a:cs typeface="Segoe UI" charset="0"/>
-                      </a:endParaRPr>
-                    </a:p>
-                    <a:p>
-                      <a:pPr indent="0" marL="0">
-                        <a:buNone/>
-                      </a:pPr>
-                      <a:r>
-                        <a:rPr lang="en-US" sz="1400" dirty="0">
-                          <a:solidFill>
-                            <a:srgbClr val="000000"/>
-                          </a:solidFill>
-                          <a:latin typeface="Segoe UI" pitchFamily="34" charset="0"/>
-                          <a:ea typeface="Segoe UI" pitchFamily="34" charset="-122"/>
-                          <a:cs typeface="Segoe UI" pitchFamily="34" charset="-120"/>
-                        </a:rPr>
-                        <a:t>+ Immediate revenue stream</a:t>
-                      </a:r>
-                      <a:endParaRPr lang="en-US" sz="1400" dirty="0">
-                        <a:latin typeface="Segoe UI" charset="0"/>
-                        <a:ea typeface="Segoe UI" charset="0"/>
-                        <a:cs typeface="Segoe UI" charset="0"/>
-                      </a:endParaRPr>
-                    </a:p>
-                    <a:p>
-                      <a:pPr indent="0" marL="0">
-                        <a:buNone/>
-                      </a:pPr>
-                      <a:r>
-                        <a:rPr lang="en-US" sz="1400" dirty="0">
-                          <a:solidFill>
-                            <a:srgbClr val="000000"/>
-                          </a:solidFill>
-                          <a:latin typeface="Segoe UI" pitchFamily="34" charset="0"/>
-                          <a:ea typeface="Segoe UI" pitchFamily="34" charset="-122"/>
-                          <a:cs typeface="Segoe UI" pitchFamily="34" charset="-120"/>
-                        </a:rPr>
-                        <a:t>+ Existing customer base</a:t>
+                        <a:t>+ Full control of operations + Immediate revenue stream + Existing customer base</a:t>
                       </a:r>
                       <a:endParaRPr lang="en-US" sz="1400" dirty="0">
                         <a:latin typeface="Segoe UI" charset="0"/>
@@ -26834,49 +26708,7 @@
                           <a:ea typeface="Segoe UI" pitchFamily="34" charset="-122"/>
                           <a:cs typeface="Segoe UI" pitchFamily="34" charset="-120"/>
                         </a:rPr>
-                        <a:t>- High upfront capital</a:t>
-                      </a:r>
-                      <a:endParaRPr lang="en-US" sz="1400" dirty="0">
-                        <a:latin typeface="Segoe UI" charset="0"/>
-                        <a:ea typeface="Segoe UI" charset="0"/>
-                        <a:cs typeface="Segoe UI" charset="0"/>
-                      </a:endParaRPr>
-                    </a:p>
-                    <a:p>
-                      <a:pPr indent="0" marL="0">
-                        <a:buNone/>
-                      </a:pPr>
-                      <a:r>
-                        <a:rPr lang="en-US" sz="1400" dirty="0">
-                          <a:solidFill>
-                            <a:srgbClr val="000000"/>
-                          </a:solidFill>
-                          <a:latin typeface="Segoe UI" pitchFamily="34" charset="0"/>
-                          <a:ea typeface="Segoe UI" pitchFamily="34" charset="-122"/>
-                          <a:cs typeface="Segoe UI" pitchFamily="34" charset="-120"/>
-                        </a:rPr>
-                        <a:t>- Integration risk</a:t>
-                      </a:r>
-                      <a:endParaRPr lang="en-US" sz="1400" dirty="0">
-                        <a:latin typeface="Segoe UI" charset="0"/>
-                        <a:ea typeface="Segoe UI" charset="0"/>
-                        <a:cs typeface="Segoe UI" charset="0"/>
-                      </a:endParaRPr>
-                    </a:p>
-                    <a:p>
-                      <a:pPr indent="0" marL="0">
-                        <a:buNone/>
-                      </a:pPr>
-                      <a:r>
-                        <a:rPr lang="en-US" sz="1400" dirty="0">
-                          <a:solidFill>
-                            <a:srgbClr val="000000"/>
-                          </a:solidFill>
-                          <a:latin typeface="Segoe UI" pitchFamily="34" charset="0"/>
-                          <a:ea typeface="Segoe UI" pitchFamily="34" charset="-122"/>
-                          <a:cs typeface="Segoe UI" pitchFamily="34" charset="-120"/>
-                        </a:rPr>
-                        <a:t>- Cultural integration challenges</a:t>
+                        <a:t>- High upfront capital - Integration risk - Cultural integration challenges</a:t>
                       </a:r>
                       <a:endParaRPr lang="en-US" sz="1400" dirty="0">
                         <a:latin typeface="Segoe UI" charset="0"/>
@@ -27268,49 +27100,7 @@
                           <a:ea typeface="Segoe UI" pitchFamily="34" charset="-122"/>
                           <a:cs typeface="Segoe UI" pitchFamily="34" charset="-120"/>
                         </a:rPr>
-                        <a:t>+ Full control from day one</a:t>
-                      </a:r>
-                      <a:endParaRPr lang="en-US" sz="1400" dirty="0">
-                        <a:latin typeface="Segoe UI" charset="0"/>
-                        <a:ea typeface="Segoe UI" charset="0"/>
-                        <a:cs typeface="Segoe UI" charset="0"/>
-                      </a:endParaRPr>
-                    </a:p>
-                    <a:p>
-                      <a:pPr indent="0" marL="0">
-                        <a:buNone/>
-                      </a:pPr>
-                      <a:r>
-                        <a:rPr lang="en-US" sz="1400" dirty="0">
-                          <a:solidFill>
-                            <a:srgbClr val="000000"/>
-                          </a:solidFill>
-                          <a:latin typeface="Segoe UI" pitchFamily="34" charset="0"/>
-                          <a:ea typeface="Segoe UI" pitchFamily="34" charset="-122"/>
-                          <a:cs typeface="Segoe UI" pitchFamily="34" charset="-120"/>
-                        </a:rPr>
-                        <a:t>+ Build culture from scratch</a:t>
-                      </a:r>
-                      <a:endParaRPr lang="en-US" sz="1400" dirty="0">
-                        <a:latin typeface="Segoe UI" charset="0"/>
-                        <a:ea typeface="Segoe UI" charset="0"/>
-                        <a:cs typeface="Segoe UI" charset="0"/>
-                      </a:endParaRPr>
-                    </a:p>
-                    <a:p>
-                      <a:pPr indent="0" marL="0">
-                        <a:buNone/>
-                      </a:pPr>
-                      <a:r>
-                        <a:rPr lang="en-US" sz="1400" dirty="0">
-                          <a:solidFill>
-                            <a:srgbClr val="000000"/>
-                          </a:solidFill>
-                          <a:latin typeface="Segoe UI" pitchFamily="34" charset="0"/>
-                          <a:ea typeface="Segoe UI" pitchFamily="34" charset="-122"/>
-                          <a:cs typeface="Segoe UI" pitchFamily="34" charset="-120"/>
-                        </a:rPr>
-                        <a:t>+ Choose optimal location</a:t>
+                        <a:t>+ Full control from day one + Build culture from scratch + Choose optimal location</a:t>
                       </a:r>
                       <a:endParaRPr lang="en-US" sz="1400" dirty="0">
                         <a:latin typeface="Segoe UI" charset="0"/>
@@ -27375,49 +27165,7 @@
                           <a:ea typeface="Segoe UI" pitchFamily="34" charset="-122"/>
                           <a:cs typeface="Segoe UI" pitchFamily="34" charset="-120"/>
                         </a:rPr>
-                        <a:t>- Slow market entry</a:t>
-                      </a:r>
-                      <a:endParaRPr lang="en-US" sz="1400" dirty="0">
-                        <a:latin typeface="Segoe UI" charset="0"/>
-                        <a:ea typeface="Segoe UI" charset="0"/>
-                        <a:cs typeface="Segoe UI" charset="0"/>
-                      </a:endParaRPr>
-                    </a:p>
-                    <a:p>
-                      <a:pPr indent="0" marL="0">
-                        <a:buNone/>
-                      </a:pPr>
-                      <a:r>
-                        <a:rPr lang="en-US" sz="1400" dirty="0">
-                          <a:solidFill>
-                            <a:srgbClr val="000000"/>
-                          </a:solidFill>
-                          <a:latin typeface="Segoe UI" pitchFamily="34" charset="0"/>
-                          <a:ea typeface="Segoe UI" pitchFamily="34" charset="-122"/>
-                          <a:cs typeface="Segoe UI" pitchFamily="34" charset="-120"/>
-                        </a:rPr>
-                        <a:t>- No existing relationships</a:t>
-                      </a:r>
-                      <a:endParaRPr lang="en-US" sz="1400" dirty="0">
-                        <a:latin typeface="Segoe UI" charset="0"/>
-                        <a:ea typeface="Segoe UI" charset="0"/>
-                        <a:cs typeface="Segoe UI" charset="0"/>
-                      </a:endParaRPr>
-                    </a:p>
-                    <a:p>
-                      <a:pPr indent="0" marL="0">
-                        <a:buNone/>
-                      </a:pPr>
-                      <a:r>
-                        <a:rPr lang="en-US" sz="1400" dirty="0">
-                          <a:solidFill>
-                            <a:srgbClr val="000000"/>
-                          </a:solidFill>
-                          <a:latin typeface="Segoe UI" pitchFamily="34" charset="0"/>
-                          <a:ea typeface="Segoe UI" pitchFamily="34" charset="-122"/>
-                          <a:cs typeface="Segoe UI" pitchFamily="34" charset="-120"/>
-                        </a:rPr>
-                        <a:t>- Must build team from scratch</a:t>
+                        <a:t>- Slow market entry - No existing relationships - Must build team from scratch</a:t>
                       </a:r>
                       <a:endParaRPr lang="en-US" sz="1400" dirty="0">
                         <a:latin typeface="Segoe UI" charset="0"/>
@@ -29548,49 +29296,7 @@
                           <a:ea typeface="Segoe UI" pitchFamily="34" charset="-122"/>
                           <a:cs typeface="Segoe UI" pitchFamily="34" charset="-120"/>
                         </a:rPr>
-                        <a:t>- Establish JV/entity structure</a:t>
-                      </a:r>
-                      <a:endParaRPr lang="en-US" sz="1400" dirty="0">
-                        <a:latin typeface="Segoe UI" charset="0"/>
-                        <a:ea typeface="Segoe UI" charset="0"/>
-                        <a:cs typeface="Segoe UI" charset="0"/>
-                      </a:endParaRPr>
-                    </a:p>
-                    <a:p>
-                      <a:pPr indent="0" marL="0">
-                        <a:buNone/>
-                      </a:pPr>
-                      <a:r>
-                        <a:rPr lang="en-US" sz="1400" dirty="0">
-                          <a:solidFill>
-                            <a:srgbClr val="000000"/>
-                          </a:solidFill>
-                          <a:latin typeface="Segoe UI" pitchFamily="34" charset="0"/>
-                          <a:ea typeface="Segoe UI" pitchFamily="34" charset="-122"/>
-                          <a:cs typeface="Segoe UI" pitchFamily="34" charset="-120"/>
-                        </a:rPr>
-                        <a:t>- Obtain BOI promotion</a:t>
-                      </a:r>
-                      <a:endParaRPr lang="en-US" sz="1400" dirty="0">
-                        <a:latin typeface="Segoe UI" charset="0"/>
-                        <a:ea typeface="Segoe UI" charset="0"/>
-                        <a:cs typeface="Segoe UI" charset="0"/>
-                      </a:endParaRPr>
-                    </a:p>
-                    <a:p>
-                      <a:pPr indent="0" marL="0">
-                        <a:buNone/>
-                      </a:pPr>
-                      <a:r>
-                        <a:rPr lang="en-US" sz="1400" dirty="0">
-                          <a:solidFill>
-                            <a:srgbClr val="000000"/>
-                          </a:solidFill>
-                          <a:latin typeface="Segoe UI" pitchFamily="34" charset="0"/>
-                          <a:ea typeface="Segoe UI" pitchFamily="34" charset="-122"/>
-                          <a:cs typeface="Segoe UI" pitchFamily="34" charset="-120"/>
-                        </a:rPr>
-                        <a:t>- Hire core team of 15-20</a:t>
+                        <a:t>- Establish JV/entity structure - Obtain BOI promotion - Hire core team of 15-20</a:t>
                       </a:r>
                       <a:endParaRPr lang="en-US" sz="1400" dirty="0">
                         <a:latin typeface="Segoe UI" charset="0"/>
@@ -29655,49 +29361,7 @@
                           <a:ea typeface="Segoe UI" pitchFamily="34" charset="-122"/>
                           <a:cs typeface="Segoe UI" pitchFamily="34" charset="-120"/>
                         </a:rPr>
-                        <a:t>- Expand to 50+ team members</a:t>
-                      </a:r>
-                      <a:endParaRPr lang="en-US" sz="1400" dirty="0">
-                        <a:latin typeface="Segoe UI" charset="0"/>
-                        <a:ea typeface="Segoe UI" charset="0"/>
-                        <a:cs typeface="Segoe UI" charset="0"/>
-                      </a:endParaRPr>
-                    </a:p>
-                    <a:p>
-                      <a:pPr indent="0" marL="0">
-                        <a:buNone/>
-                      </a:pPr>
-                      <a:r>
-                        <a:rPr lang="en-US" sz="1400" dirty="0">
-                          <a:solidFill>
-                            <a:srgbClr val="000000"/>
-                          </a:solidFill>
-                          <a:latin typeface="Segoe UI" pitchFamily="34" charset="0"/>
-                          <a:ea typeface="Segoe UI" pitchFamily="34" charset="-122"/>
-                          <a:cs typeface="Segoe UI" pitchFamily="34" charset="-120"/>
-                        </a:rPr>
-                        <a:t>- Build project pipeline to 20+ opportunities</a:t>
-                      </a:r>
-                      <a:endParaRPr lang="en-US" sz="1400" dirty="0">
-                        <a:latin typeface="Segoe UI" charset="0"/>
-                        <a:ea typeface="Segoe UI" charset="0"/>
-                        <a:cs typeface="Segoe UI" charset="0"/>
-                      </a:endParaRPr>
-                    </a:p>
-                    <a:p>
-                      <a:pPr indent="0" marL="0">
-                        <a:buNone/>
-                      </a:pPr>
-                      <a:r>
-                        <a:rPr lang="en-US" sz="1400" dirty="0">
-                          <a:solidFill>
-                            <a:srgbClr val="000000"/>
-                          </a:solidFill>
-                          <a:latin typeface="Segoe UI" pitchFamily="34" charset="0"/>
-                          <a:ea typeface="Segoe UI" pitchFamily="34" charset="-122"/>
-                          <a:cs typeface="Segoe UI" pitchFamily="34" charset="-120"/>
-                        </a:rPr>
-                        <a:t>- Develop financing partnerships</a:t>
+                        <a:t>- Expand to 50+ team members - Build project pipeline to 20+ opportunities - Develop financing partnerships</a:t>
                       </a:r>
                       <a:endParaRPr lang="en-US" sz="1400" dirty="0">
                         <a:latin typeface="Segoe UI" charset="0"/>
@@ -29762,49 +29426,7 @@
                           <a:ea typeface="Segoe UI" pitchFamily="34" charset="-122"/>
                           <a:cs typeface="Segoe UI" pitchFamily="34" charset="-120"/>
                         </a:rPr>
-                        <a:t>- Expand beyond Bangkok to regional markets</a:t>
-                      </a:r>
-                      <a:endParaRPr lang="en-US" sz="1400" dirty="0">
-                        <a:latin typeface="Segoe UI" charset="0"/>
-                        <a:ea typeface="Segoe UI" charset="0"/>
-                        <a:cs typeface="Segoe UI" charset="0"/>
-                      </a:endParaRPr>
-                    </a:p>
-                    <a:p>
-                      <a:pPr indent="0" marL="0">
-                        <a:buNone/>
-                      </a:pPr>
-                      <a:r>
-                        <a:rPr lang="en-US" sz="1400" dirty="0">
-                          <a:solidFill>
-                            <a:srgbClr val="000000"/>
-                          </a:solidFill>
-                          <a:latin typeface="Segoe UI" pitchFamily="34" charset="0"/>
-                          <a:ea typeface="Segoe UI" pitchFamily="34" charset="-122"/>
-                          <a:cs typeface="Segoe UI" pitchFamily="34" charset="-120"/>
-                        </a:rPr>
-                        <a:t>- Launch IoT-based monitoring platform</a:t>
-                      </a:r>
-                      <a:endParaRPr lang="en-US" sz="1400" dirty="0">
-                        <a:latin typeface="Segoe UI" charset="0"/>
-                        <a:ea typeface="Segoe UI" charset="0"/>
-                        <a:cs typeface="Segoe UI" charset="0"/>
-                      </a:endParaRPr>
-                    </a:p>
-                    <a:p>
-                      <a:pPr indent="0" marL="0">
-                        <a:buNone/>
-                      </a:pPr>
-                      <a:r>
-                        <a:rPr lang="en-US" sz="1400" dirty="0">
-                          <a:solidFill>
-                            <a:srgbClr val="000000"/>
-                          </a:solidFill>
-                          <a:latin typeface="Segoe UI" pitchFamily="34" charset="0"/>
-                          <a:ea typeface="Segoe UI" pitchFamily="34" charset="-122"/>
-                          <a:cs typeface="Segoe UI" pitchFamily="34" charset="-120"/>
-                        </a:rPr>
-                        <a:t>- Develop strategic partnerships</a:t>
+                        <a:t>- Expand beyond Bangkok to regional markets - Launch IoT-based monitoring platform - Develop strategic partnerships</a:t>
                       </a:r>
                       <a:endParaRPr lang="en-US" sz="1400" dirty="0">
                         <a:latin typeface="Segoe UI" charset="0"/>
@@ -29871,28 +29493,7 @@
                           <a:ea typeface="Segoe UI" pitchFamily="34" charset="-122"/>
                           <a:cs typeface="Segoe UI" pitchFamily="34" charset="-120"/>
                         </a:rPr>
-                        <a:t>Milestones: BOI approval obtained, First pilot project signed</a:t>
-                      </a:r>
-                      <a:endParaRPr lang="en-US" sz="1400" dirty="0">
-                        <a:latin typeface="Segoe UI" charset="0"/>
-                        <a:ea typeface="Segoe UI" charset="0"/>
-                        <a:cs typeface="Segoe UI" charset="0"/>
-                      </a:endParaRPr>
-                    </a:p>
-                    <a:p>
-                      <a:pPr indent="0" marL="0">
-                        <a:buNone/>
-                      </a:pPr>
-                      <a:r>
-                        <a:rPr lang="en-US" sz="1400" dirty="0">
-                          <a:solidFill>
-                            <a:srgbClr val="808080"/>
-                          </a:solidFill>
-                          <a:latin typeface="Segoe UI" pitchFamily="34" charset="0"/>
-                          <a:ea typeface="Segoe UI" pitchFamily="34" charset="-122"/>
-                          <a:cs typeface="Segoe UI" pitchFamily="34" charset="-120"/>
-                        </a:rPr>
-                        <a:t>Investment: USD 5-8M</a:t>
+                        <a:t>Milestones: BOI approval obtained, First pilot project signed Investment: USD 5-8M</a:t>
                       </a:r>
                       <a:endParaRPr lang="en-US" sz="1400" dirty="0">
                         <a:latin typeface="Segoe UI" charset="0"/>
@@ -29957,28 +29558,7 @@
                           <a:ea typeface="Segoe UI" pitchFamily="34" charset="-122"/>
                           <a:cs typeface="Segoe UI" pitchFamily="34" charset="-120"/>
                         </a:rPr>
-                        <a:t>Milestones: 10th project completed, Revenue reaches THB 500M</a:t>
-                      </a:r>
-                      <a:endParaRPr lang="en-US" sz="1400" dirty="0">
-                        <a:latin typeface="Segoe UI" charset="0"/>
-                        <a:ea typeface="Segoe UI" charset="0"/>
-                        <a:cs typeface="Segoe UI" charset="0"/>
-                      </a:endParaRPr>
-                    </a:p>
-                    <a:p>
-                      <a:pPr indent="0" marL="0">
-                        <a:buNone/>
-                      </a:pPr>
-                      <a:r>
-                        <a:rPr lang="en-US" sz="1400" dirty="0">
-                          <a:solidFill>
-                            <a:srgbClr val="808080"/>
-                          </a:solidFill>
-                          <a:latin typeface="Segoe UI" pitchFamily="34" charset="0"/>
-                          <a:ea typeface="Segoe UI" pitchFamily="34" charset="-122"/>
-                          <a:cs typeface="Segoe UI" pitchFamily="34" charset="-120"/>
-                        </a:rPr>
-                        <a:t>Investment: USD 8-12M</a:t>
+                        <a:t>Milestones: 10th project completed, Revenue reaches THB 500M Investment: USD 8-12M</a:t>
                       </a:r>
                       <a:endParaRPr lang="en-US" sz="1400" dirty="0">
                         <a:latin typeface="Segoe UI" charset="0"/>
@@ -30043,28 +29623,7 @@
                           <a:ea typeface="Segoe UI" pitchFamily="34" charset="-122"/>
                           <a:cs typeface="Segoe UI" pitchFamily="34" charset="-120"/>
                         </a:rPr>
-                        <a:t>Milestones: Top 5 market position, THB 1.5B annual revenue</a:t>
-                      </a:r>
-                      <a:endParaRPr lang="en-US" sz="1400" dirty="0">
-                        <a:latin typeface="Segoe UI" charset="0"/>
-                        <a:ea typeface="Segoe UI" charset="0"/>
-                        <a:cs typeface="Segoe UI" charset="0"/>
-                      </a:endParaRPr>
-                    </a:p>
-                    <a:p>
-                      <a:pPr indent="0" marL="0">
-                        <a:buNone/>
-                      </a:pPr>
-                      <a:r>
-                        <a:rPr lang="en-US" sz="1400" dirty="0">
-                          <a:solidFill>
-                            <a:srgbClr val="808080"/>
-                          </a:solidFill>
-                          <a:latin typeface="Segoe UI" pitchFamily="34" charset="0"/>
-                          <a:ea typeface="Segoe UI" pitchFamily="34" charset="-122"/>
-                          <a:cs typeface="Segoe UI" pitchFamily="34" charset="-120"/>
-                        </a:rPr>
-                        <a:t>Investment: USD 7-15M</a:t>
+                        <a:t>Milestones: Top 5 market position, THB 1.5B annual revenue Investment: USD 7-15M</a:t>
                       </a:r>
                       <a:endParaRPr lang="en-US" sz="1400" dirty="0">
                         <a:latin typeface="Segoe UI" charset="0"/>
@@ -30439,11 +29998,11 @@
             <a:tbl>
               <a:tblPr/>
               <a:tblGrid>
-                <a:gridCol w="3114152"/>
-                <a:gridCol w="2707958"/>
-                <a:gridCol w="2166366"/>
-                <a:gridCol w="2437162"/>
-                <a:gridCol w="1083183"/>
+                <a:gridCol w="2569931"/>
+                <a:gridCol w="2234723"/>
+                <a:gridCol w="1787778"/>
+                <a:gridCol w="4022501"/>
+                <a:gridCol w="893889"/>
               </a:tblGrid>
               <a:tr h="411480">
                 <a:tc>
@@ -30985,7 +30544,7 @@
                           <a:ea typeface="Segoe UI" pitchFamily="34" charset="-122"/>
                           <a:cs typeface="Segoe UI" pitchFamily="34" charset="-120"/>
                         </a:rPr>
-                        <a:t>Japan HQ + loca...</a:t>
+                        <a:t>Japan HQ + local plant manager</a:t>
                       </a:r>
                       <a:endParaRPr lang="en-US" sz="1400" dirty="0">
                         <a:latin typeface="Segoe UI" charset="0"/>
@@ -31312,7 +30871,7 @@
                           <a:ea typeface="Segoe UI" pitchFamily="34" charset="-122"/>
                           <a:cs typeface="Segoe UI" pitchFamily="34" charset="-120"/>
                         </a:rPr>
-                        <a:t>Estate manageme...</a:t>
+                        <a:t>Estate management + tenant committee</a:t>
                       </a:r>
                       <a:endParaRPr lang="en-US" sz="1400" dirty="0">
                         <a:latin typeface="Segoe UI" charset="0"/>
@@ -31639,7 +31198,7 @@
                           <a:ea typeface="Segoe UI" pitchFamily="34" charset="-122"/>
                           <a:cs typeface="Segoe UI" pitchFamily="34" charset="-120"/>
                         </a:rPr>
-                        <a:t>Property manage...</a:t>
+                        <a:t>Property management / building owner</a:t>
                       </a:r>
                       <a:endParaRPr lang="en-US" sz="1400" dirty="0">
                         <a:latin typeface="Segoe UI" charset="0"/>
@@ -31881,10 +31440,10 @@
             <a:tbl>
               <a:tblPr/>
               <a:tblGrid>
-                <a:gridCol w="2911870"/>
-                <a:gridCol w="2357228"/>
-                <a:gridCol w="2357228"/>
-                <a:gridCol w="3882494"/>
+                <a:gridCol w="2441265"/>
+                <a:gridCol w="1976262"/>
+                <a:gridCol w="1976262"/>
+                <a:gridCol w="5115032"/>
               </a:tblGrid>
               <a:tr h="228600">
                 <a:tc>
@@ -32359,7 +31918,7 @@
                           <a:ea typeface="Segoe UI" pitchFamily="34" charset="-122"/>
                           <a:cs typeface="Segoe UI" pitchFamily="34" charset="-120"/>
                         </a:rPr>
-                        <a:t>Gateway City Industrial...</a:t>
+                        <a:t>Gateway City Industrial Estate, Chachoengsao</a:t>
                       </a:r>
                       <a:endParaRPr lang="en-US" sz="1400" dirty="0">
                         <a:latin typeface="Segoe UI" charset="0"/>
@@ -32619,7 +32178,7 @@
                           <a:ea typeface="Segoe UI" pitchFamily="34" charset="-122"/>
                           <a:cs typeface="Segoe UI" pitchFamily="34" charset="-120"/>
                         </a:rPr>
-                        <a:t>Map Ta Phut Industrial...</a:t>
+                        <a:t>Map Ta Phut Industrial Estate, Rayong</a:t>
                       </a:r>
                       <a:endParaRPr lang="en-US" sz="1400" dirty="0">
                         <a:latin typeface="Segoe UI" charset="0"/>
@@ -32879,7 +32438,7 @@
                           <a:ea typeface="Segoe UI" pitchFamily="34" charset="-122"/>
                           <a:cs typeface="Segoe UI" pitchFamily="34" charset="-120"/>
                         </a:rPr>
-                        <a:t>Bangkok metropolitan area...</a:t>
+                        <a:t>Bangkok metropolitan area (45 properties)</a:t>
                       </a:r>
                       <a:endParaRPr lang="en-US" sz="1400" dirty="0">
                         <a:latin typeface="Segoe UI" charset="0"/>
@@ -33907,7 +33466,7 @@
                           <a:ea typeface="Segoe UI" pitchFamily="34" charset="-122"/>
                           <a:cs typeface="Segoe UI" pitchFamily="34" charset="-120"/>
                         </a:rPr>
-                        <a:t>Technology gap in industrial ESCO segment; Japanese manufacturing base...</a:t>
+                        <a:t>Technology gap in industrial ESCO segment; Japanese manufacturing base creates captive demand</a:t>
                       </a:r>
                       <a:endParaRPr lang="en-US" sz="1400" dirty="0">
                         <a:latin typeface="Segoe UI" charset="0"/>
@@ -34498,7 +34057,7 @@
                           <a:ea typeface="Segoe UI" pitchFamily="34" charset="-122"/>
                           <a:cs typeface="Segoe UI" pitchFamily="34" charset="-120"/>
                         </a:rPr>
-                        <a:t>Recent government transition creates policy uncertainty; new administration...</a:t>
+                        <a:t>Recent government transition creates policy uncertainty; new administration energy priorities unclear until mid-2025</a:t>
                       </a:r>
                       <a:endParaRPr lang="en-US" sz="1400" dirty="0">
                         <a:latin typeface="Segoe UI" charset="0"/>
@@ -36007,9 +35566,9 @@
             <a:tbl>
               <a:tblPr/>
               <a:tblGrid>
-                <a:gridCol w="2432759"/>
-                <a:gridCol w="4584815"/>
-                <a:gridCol w="4491247"/>
+                <a:gridCol w="1284246"/>
+                <a:gridCol w="5383955"/>
+                <a:gridCol w="4840620"/>
               </a:tblGrid>
               <a:tr h="374904">
                 <a:tc>
@@ -36291,7 +35850,7 @@
                           <a:ea typeface="Segoe UI" pitchFamily="34" charset="-122"/>
                           <a:cs typeface="Segoe UI" pitchFamily="34" charset="-120"/>
                         </a:rPr>
-                        <a:t>Creates mandatory reporting and financial...</a:t>
+                        <a:t>Creates mandatory reporting and financial incentive for energy efficiency — estimated 3x ESCO demand increase</a:t>
                       </a:r>
                       <a:endParaRPr lang="en-US" sz="1400" dirty="0">
                         <a:latin typeface="Segoe UI" charset="0"/>
@@ -36356,7 +35915,7 @@
                           <a:ea typeface="Segoe UI" pitchFamily="34" charset="-122"/>
                           <a:cs typeface="Segoe UI" pitchFamily="34" charset="-120"/>
                         </a:rPr>
-                        <a:t>Begin pre-positioning marketing campaigns and...</a:t>
+                        <a:t>Begin pre-positioning marketing campaigns and carbon audit service development by Q3 2025</a:t>
                       </a:r>
                       <a:endParaRPr lang="en-US" sz="1400" dirty="0">
                         <a:latin typeface="Segoe UI" charset="0"/>
@@ -36488,7 +36047,7 @@
                           <a:ea typeface="Segoe UI" pitchFamily="34" charset="-122"/>
                           <a:cs typeface="Segoe UI" pitchFamily="34" charset="-120"/>
                         </a:rPr>
-                        <a:t>30 pilot cities releasing THB 5B in energy...</a:t>
+                        <a:t>30 pilot cities releasing THB 5B in energy management contracts starting Q3 2025</a:t>
                       </a:r>
                       <a:endParaRPr lang="en-US" sz="1400" dirty="0">
                         <a:latin typeface="Segoe UI" charset="0"/>
@@ -36553,7 +36112,7 @@
                           <a:ea typeface="Segoe UI" pitchFamily="34" charset="-122"/>
                           <a:cs typeface="Segoe UI" pitchFamily="34" charset="-120"/>
                         </a:rPr>
-                        <a:t>Complete DEDE ESCO registration and secure at...</a:t>
+                        <a:t>Complete DEDE ESCO registration and secure at least 2 government reference projects before Q3 2025</a:t>
                       </a:r>
                       <a:endParaRPr lang="en-US" sz="1400" dirty="0">
                         <a:latin typeface="Segoe UI" charset="0"/>
@@ -36685,7 +36244,7 @@
                           <a:ea typeface="Segoe UI" pitchFamily="34" charset="-122"/>
                           <a:cs typeface="Segoe UI" pitchFamily="34" charset="-120"/>
                         </a:rPr>
-                        <a:t>THB 200B in manufacturing investment requiring...</a:t>
+                        <a:t>THB 200B in manufacturing investment requiring factory energy systems through 2027</a:t>
                       </a:r>
                       <a:endParaRPr lang="en-US" sz="1400" dirty="0">
                         <a:latin typeface="Segoe UI" charset="0"/>
@@ -36750,7 +36309,7 @@
                           <a:ea typeface="Segoe UI" pitchFamily="34" charset="-122"/>
                           <a:cs typeface="Segoe UI" pitchFamily="34" charset="-120"/>
                         </a:rPr>
-                        <a:t>Activate Japan HQ channel partnerships and...</a:t>
+                        <a:t>Activate Japan HQ channel partnerships and assign dedicated Japan-desk team by Q1 2025</a:t>
                       </a:r>
                       <a:endParaRPr lang="en-US" sz="1400" dirty="0">
                         <a:latin typeface="Segoe UI" charset="0"/>
@@ -36882,7 +36441,7 @@
                           <a:ea typeface="Segoe UI" pitchFamily="34" charset="-122"/>
                           <a:cs typeface="Segoe UI" pitchFamily="34" charset="-120"/>
                         </a:rPr>
-                        <a:t>Regional carbon trading creates monetization...</a:t>
+                        <a:t>Regional carbon trading creates monetization path for energy savings certificates</a:t>
                       </a:r>
                       <a:endParaRPr lang="en-US" sz="1400" dirty="0">
                         <a:latin typeface="Segoe UI" charset="0"/>
@@ -36947,7 +36506,7 @@
                           <a:ea typeface="Segoe UI" pitchFamily="34" charset="-122"/>
                           <a:cs typeface="Segoe UI" pitchFamily="34" charset="-120"/>
                         </a:rPr>
-                        <a:t>Develop carbon credit quantification...</a:t>
+                        <a:t>Develop carbon credit quantification methodology for ESCO projects</a:t>
                       </a:r>
                       <a:endParaRPr lang="en-US" sz="1400" dirty="0">
                         <a:latin typeface="Segoe UI" charset="0"/>
@@ -37530,7 +37089,7 @@
                           <a:ea typeface="Segoe UI" pitchFamily="34" charset="-122"/>
                           <a:cs typeface="Segoe UI" pitchFamily="34" charset="-120"/>
                         </a:rPr>
-                        <a:t>Attempted greenfield entry without local partner; failed...</a:t>
+                        <a:t>Attempted greenfield entry without local partner; failed to win any government contracts in 2 years</a:t>
                       </a:r>
                       <a:endParaRPr lang="en-US" sz="1400" dirty="0">
                         <a:latin typeface="Segoe UI" charset="0"/>
@@ -37727,7 +37286,7 @@
                           <a:ea typeface="Segoe UI" pitchFamily="34" charset="-122"/>
                           <a:cs typeface="Segoe UI" pitchFamily="34" charset="-120"/>
                         </a:rPr>
-                        <a:t>Aggressive low-price strategy eroded margins; exited...</a:t>
+                        <a:t>Aggressive low-price strategy eroded margins; exited after 18 months with THB 50M loss</a:t>
                       </a:r>
                       <a:endParaRPr lang="en-US" sz="1400" dirty="0">
                         <a:latin typeface="Segoe UI" charset="0"/>
@@ -37792,7 +37351,7 @@
                           <a:ea typeface="Segoe UI" pitchFamily="34" charset="-122"/>
                           <a:cs typeface="Segoe UI" pitchFamily="34" charset="-120"/>
                         </a:rPr>
-                        <a:t>Price competition alone is unsustainable in...</a:t>
+                        <a:t>Price competition alone is unsustainable in relationship-driven Thai market</a:t>
                       </a:r>
                       <a:endParaRPr lang="en-US" sz="1400" dirty="0">
                         <a:latin typeface="Segoe UI" charset="0"/>
@@ -37924,7 +37483,7 @@
                           <a:ea typeface="Segoe UI" pitchFamily="34" charset="-122"/>
                           <a:cs typeface="Segoe UI" pitchFamily="34" charset="-120"/>
                         </a:rPr>
-                        <a:t>Over-engineered solutions for Thai market; average...</a:t>
+                        <a:t>Over-engineered solutions for Thai market; average project cost 2x local competitors</a:t>
                       </a:r>
                       <a:endParaRPr lang="en-US" sz="1400" dirty="0">
                         <a:latin typeface="Segoe UI" charset="0"/>
@@ -39647,7 +39206,7 @@
                           <a:ea typeface="Segoe UI" pitchFamily="34" charset="-122"/>
                           <a:cs typeface="Segoe UI" pitchFamily="34" charset="-120"/>
                         </a:rPr>
-                        <a:t>Large addressable market (THB 12B+) with strong growth drivers (carbon tax,...</a:t>
+                        <a:t>Large addressable market (THB 12B+) with strong growth drivers (carbon tax, smart city mandate, industrial relocation); favorable regulatory environment with BOI incentives reducing effective tax to near-zero for first 8 years</a:t>
                       </a:r>
                       <a:endParaRPr lang="en-US" sz="1400" dirty="0">
                         <a:latin typeface="Segoe UI" charset="0"/>
@@ -39844,7 +39403,7 @@
                           <a:ea typeface="Segoe UI" pitchFamily="34" charset="-122"/>
                           <a:cs typeface="Segoe UI" pitchFamily="34" charset="-120"/>
                         </a:rPr>
-                        <a:t>Established ESCO market with clear regulatory framework; main challenges are...</a:t>
+                        <a:t>Established ESCO market with clear regulatory framework; main challenges are relationship-driven sales cycle and 45+ existing competitors requiring differentiated value proposition</a:t>
                       </a:r>
                       <a:endParaRPr lang="en-US" sz="1400" dirty="0">
                         <a:latin typeface="Segoe UI" charset="0"/>
@@ -41446,28 +41005,7 @@
                           <a:ea typeface="Segoe UI" pitchFamily="34" charset="-122"/>
                           <a:cs typeface="Segoe UI" pitchFamily="34" charset="-120"/>
                         </a:rPr>
-                        <a:t>Designated facilities must appoint energy managers, submit energy management reports, and implement efficiency improvement plans</a:t>
-                      </a:r>
-                      <a:endParaRPr lang="en-US" sz="1400" dirty="0">
-                        <a:latin typeface="Segoe UI" charset="0"/>
-                        <a:ea typeface="Segoe UI" charset="0"/>
-                        <a:cs typeface="Segoe UI" charset="0"/>
-                      </a:endParaRPr>
-                    </a:p>
-                    <a:p>
-                      <a:pPr indent="0" marL="0">
-                        <a:buNone/>
-                      </a:pPr>
-                      <a:r>
-                        <a:rPr lang="en-US" sz="1400" dirty="0">
-                          <a:solidFill>
-                            <a:srgbClr val="000000"/>
-                          </a:solidFill>
-                          <a:latin typeface="Segoe UI" pitchFamily="34" charset="0"/>
-                          <a:ea typeface="Segoe UI" pitchFamily="34" charset="-122"/>
-                          <a:cs typeface="Segoe UI" pitchFamily="34" charset="-120"/>
-                        </a:rPr>
-                        <a:t>Penalties: Fines up to THB 500,000 for non-compliance; facility shutdown orders for repeat violations</a:t>
+                        <a:t>Designated facilities must appoint energy managers, submit energy management reports, and implement efficiency improvement plans Penalties: Fines up to THB 500,000 for non-compliance; facility shutdown orders for repeat violations</a:t>
                       </a:r>
                       <a:endParaRPr lang="en-US" sz="1400" dirty="0">
                         <a:latin typeface="Segoe UI" charset="0"/>
@@ -41532,7 +41070,7 @@
                           <a:ea typeface="Segoe UI" pitchFamily="34" charset="-122"/>
                           <a:cs typeface="Segoe UI" pitchFamily="34" charset="-120"/>
                         </a:rPr>
-                        <a:t>Department of Alternative Energy Development and Efficiency (DEDE) conducts...</a:t>
+                        <a:t>Department of Alternative Energy Development and Efficiency (DEDE) conducts annual audits with mandatory compliance deadlines</a:t>
                       </a:r>
                       <a:endParaRPr lang="en-US" sz="1400" dirty="0">
                         <a:latin typeface="Segoe UI" charset="0"/>
@@ -41729,28 +41267,7 @@
                           <a:ea typeface="Segoe UI" pitchFamily="34" charset="-122"/>
                           <a:cs typeface="Segoe UI" pitchFamily="34" charset="-120"/>
                         </a:rPr>
-                        <a:t>Licensing framework for energy service providers including ESCOs; technical standards for energy equipment and performance contracting</a:t>
-                      </a:r>
-                      <a:endParaRPr lang="en-US" sz="1400" dirty="0">
-                        <a:latin typeface="Segoe UI" charset="0"/>
-                        <a:ea typeface="Segoe UI" charset="0"/>
-                        <a:cs typeface="Segoe UI" charset="0"/>
-                      </a:endParaRPr>
-                    </a:p>
-                    <a:p>
-                      <a:pPr indent="0" marL="0">
-                        <a:buNone/>
-                      </a:pPr>
-                      <a:r>
-                        <a:rPr lang="en-US" sz="1400" dirty="0">
-                          <a:solidFill>
-                            <a:srgbClr val="000000"/>
-                          </a:solidFill>
-                          <a:latin typeface="Segoe UI" pitchFamily="34" charset="0"/>
-                          <a:ea typeface="Segoe UI" pitchFamily="34" charset="-122"/>
-                          <a:cs typeface="Segoe UI" pitchFamily="34" charset="-120"/>
-                        </a:rPr>
-                        <a:t>Penalties: License revocation and fines up to THB 1,000,000; criminal liability for safety violations</a:t>
+                        <a:t>Licensing framework for energy service providers including ESCOs; technical standards for energy equipment and performance contracting Penalties: License revocation and fines up to THB 1,000,000; criminal liability for safety violations</a:t>
                       </a:r>
                       <a:endParaRPr lang="en-US" sz="1400" dirty="0">
                         <a:latin typeface="Segoe UI" charset="0"/>
@@ -41815,7 +41332,7 @@
                           <a:ea typeface="Segoe UI" pitchFamily="34" charset="-122"/>
                           <a:cs typeface="Segoe UI" pitchFamily="34" charset="-120"/>
                         </a:rPr>
-                        <a:t>Energy Regulatory Commission (ERC) oversees licensing and compliance, annual...</a:t>
+                        <a:t>Energy Regulatory Commission (ERC) oversees licensing and compliance, annual performance reviews</a:t>
                       </a:r>
                       <a:endParaRPr lang="en-US" sz="1400" dirty="0">
                         <a:latin typeface="Segoe UI" charset="0"/>
@@ -42012,28 +41529,7 @@
                           <a:ea typeface="Segoe UI" pitchFamily="34" charset="-122"/>
                           <a:cs typeface="Segoe UI" pitchFamily="34" charset="-120"/>
                         </a:rPr>
-                        <a:t>New commercial buildings over 2,000 sqm must meet minimum energy performance standards including OTTV below 50 W/sqm</a:t>
-                      </a:r>
-                      <a:endParaRPr lang="en-US" sz="1400" dirty="0">
-                        <a:latin typeface="Segoe UI" charset="0"/>
-                        <a:ea typeface="Segoe UI" charset="0"/>
-                        <a:cs typeface="Segoe UI" charset="0"/>
-                      </a:endParaRPr>
-                    </a:p>
-                    <a:p>
-                      <a:pPr indent="0" marL="0">
-                        <a:buNone/>
-                      </a:pPr>
-                      <a:r>
-                        <a:rPr lang="en-US" sz="1400" dirty="0">
-                          <a:solidFill>
-                            <a:srgbClr val="000000"/>
-                          </a:solidFill>
-                          <a:latin typeface="Segoe UI" pitchFamily="34" charset="0"/>
-                          <a:ea typeface="Segoe UI" pitchFamily="34" charset="-122"/>
-                          <a:cs typeface="Segoe UI" pitchFamily="34" charset="-120"/>
-                        </a:rPr>
-                        <a:t>Penalties: Construction permit denial; mandatory retrofit within 2 years of non-compliance finding</a:t>
+                        <a:t>New commercial buildings over 2,000 sqm must meet minimum energy performance standards including OTTV below 50 W/sqm Penalties: Construction permit denial; mandatory retrofit within 2 years of non-compliance finding</a:t>
                       </a:r>
                       <a:endParaRPr lang="en-US" sz="1400" dirty="0">
                         <a:latin typeface="Segoe UI" charset="0"/>
@@ -42098,7 +41594,7 @@
                           <a:ea typeface="Segoe UI" pitchFamily="34" charset="-122"/>
                           <a:cs typeface="Segoe UI" pitchFamily="34" charset="-120"/>
                         </a:rPr>
-                        <a:t>Local building authorities verify compliance during construction permits and...</a:t>
+                        <a:t>Local building authorities verify compliance during construction permits and occupancy approvals</a:t>
                       </a:r>
                       <a:endParaRPr lang="en-US" sz="1400" dirty="0">
                         <a:latin typeface="Segoe UI" charset="0"/>
@@ -44281,7 +43777,7 @@
                           <a:ea typeface="Segoe UI" pitchFamily="34" charset="-122"/>
                           <a:cs typeface="Segoe UI" pitchFamily="34" charset="-120"/>
                         </a:rPr>
-                        <a:t>BOI-promoted projects may receive 100% foreign ownership; Treaty of Amity allows US nationals...</a:t>
+                        <a:t>BOI-promoted projects may receive 100% foreign ownership; Treaty of Amity allows US nationals majority ownership</a:t>
                       </a:r>
                       <a:endParaRPr lang="en-US" sz="1400" dirty="0">
                         <a:latin typeface="Segoe UI" charset="0"/>
@@ -44892,7 +44388,7 @@
                           <a:ea typeface="Segoe UI" pitchFamily="34" charset="-122"/>
                           <a:cs typeface="Segoe UI" pitchFamily="34" charset="-120"/>
                         </a:rPr>
-                        <a:t>Projects with minimum THB 50M investment in...</a:t>
+                        <a:t>Projects with minimum THB 50M investment in energy efficiency technology</a:t>
                       </a:r>
                       <a:endParaRPr lang="en-US" sz="1400" dirty="0">
                         <a:latin typeface="Segoe UI" charset="0"/>
@@ -45089,7 +44585,7 @@
                           <a:ea typeface="Segoe UI" pitchFamily="34" charset="-122"/>
                           <a:cs typeface="Segoe UI" pitchFamily="34" charset="-120"/>
                         </a:rPr>
-                        <a:t>Operations located in Chachoengsao, Chonburi,...</a:t>
+                        <a:t>Operations located in Chachoengsao, Chonburi, or Rayong provinces</a:t>
                       </a:r>
                       <a:endParaRPr lang="en-US" sz="1400" dirty="0">
                         <a:latin typeface="Segoe UI" charset="0"/>
@@ -45286,7 +44782,7 @@
                           <a:ea typeface="Segoe UI" pitchFamily="34" charset="-122"/>
                           <a:cs typeface="Segoe UI" pitchFamily="34" charset="-120"/>
                         </a:rPr>
-                        <a:t>Certified green projects per Thai Green Bond...</a:t>
+                        <a:t>Certified green projects per Thai Green Bond framework</a:t>
                       </a:r>
                       <a:endParaRPr lang="en-US" sz="1400" dirty="0">
                         <a:latin typeface="Segoe UI" charset="0"/>

</xml_diff>